<commit_message>
Fixed Daily Diff Calculation & Picture Update in Doc
</commit_message>
<xml_diff>
--- a/RocketLeagueCompanion/Documents/Andreas_Klar-B-MC_MOVS18_Rocket_League_Companion_Präsentation.pptx
+++ b/RocketLeagueCompanion/Documents/Andreas_Klar-B-MC_MOVS18_Rocket_League_Companion_Präsentation.pptx
@@ -114,6 +114,11 @@
       </a:defRPr>
     </a:lvl9pPr>
   </p:defaultTextStyle>
+  <p:extLst>
+    <p:ext uri="{EFAFB233-063F-42B5-8137-9DF3F51BA10A}">
+      <p15:sldGuideLst xmlns:p15="http://schemas.microsoft.com/office/powerpoint/2012/main"/>
+    </p:ext>
+  </p:extLst>
 </p:presentation>
 </file>
 
@@ -199,7 +204,7 @@
           <a:p>
             <a:fld id="{637653D3-18CB-452D-891A-1ACB9ECCD7EF}" type="datetimeFigureOut">
               <a:rPr lang="de-DE" smtClean="0"/>
-              <a:t>13.06.2018</a:t>
+              <a:t>16.06.2018</a:t>
             </a:fld>
             <a:endParaRPr lang="de-DE"/>
           </a:p>
@@ -667,7 +672,7 @@
           <a:p>
             <a:fld id="{A68E2259-6BFD-48B8-9E1D-8E8C350B9DE1}" type="datetime1">
               <a:rPr lang="de-DE" smtClean="0"/>
-              <a:t>13.06.2018</a:t>
+              <a:t>16.06.2018</a:t>
             </a:fld>
             <a:endParaRPr lang="de-DE" dirty="0"/>
           </a:p>
@@ -1124,7 +1129,7 @@
           <a:p>
             <a:fld id="{C4FABEC5-5047-464C-9AC7-D37775867826}" type="datetime1">
               <a:rPr lang="de-DE" smtClean="0"/>
-              <a:t>13.06.2018</a:t>
+              <a:t>16.06.2018</a:t>
             </a:fld>
             <a:endParaRPr lang="de-DE"/>
           </a:p>
@@ -1378,7 +1383,7 @@
           <a:p>
             <a:fld id="{A3E5C0EE-0750-4500-BF41-3A5722761DF5}" type="datetime1">
               <a:rPr lang="de-DE" smtClean="0"/>
-              <a:t>13.06.2018</a:t>
+              <a:t>16.06.2018</a:t>
             </a:fld>
             <a:endParaRPr lang="de-DE"/>
           </a:p>
@@ -1690,7 +1695,7 @@
           <a:p>
             <a:fld id="{C8294CB5-296E-4FCB-B36F-93ACB82BF21C}" type="datetime1">
               <a:rPr lang="de-DE" smtClean="0"/>
-              <a:t>13.06.2018</a:t>
+              <a:t>16.06.2018</a:t>
             </a:fld>
             <a:endParaRPr lang="de-DE"/>
           </a:p>
@@ -2012,7 +2017,7 @@
           <a:p>
             <a:fld id="{DEB173E1-C5EE-4B20-A9E9-F77B5B15A197}" type="datetime1">
               <a:rPr lang="de-DE" smtClean="0"/>
-              <a:t>13.06.2018</a:t>
+              <a:t>16.06.2018</a:t>
             </a:fld>
             <a:endParaRPr lang="de-DE"/>
           </a:p>
@@ -2318,7 +2323,7 @@
           <a:p>
             <a:fld id="{93561A44-56F9-4CD6-A55F-F78151DA6456}" type="datetime1">
               <a:rPr lang="de-DE" smtClean="0"/>
-              <a:t>13.06.2018</a:t>
+              <a:t>16.06.2018</a:t>
             </a:fld>
             <a:endParaRPr lang="de-DE"/>
           </a:p>
@@ -2689,7 +2694,7 @@
           <a:p>
             <a:fld id="{FD5C03D3-D0EF-4841-AB2E-1C36D2F91052}" type="datetime1">
               <a:rPr lang="de-DE" smtClean="0"/>
-              <a:t>13.06.2018</a:t>
+              <a:t>16.06.2018</a:t>
             </a:fld>
             <a:endParaRPr lang="de-DE"/>
           </a:p>
@@ -2867,7 +2872,7 @@
           <a:p>
             <a:fld id="{F99B411A-E1F1-4DCF-BF83-A63E2894993A}" type="datetime1">
               <a:rPr lang="de-DE" smtClean="0"/>
-              <a:t>13.06.2018</a:t>
+              <a:t>16.06.2018</a:t>
             </a:fld>
             <a:endParaRPr lang="de-DE"/>
           </a:p>
@@ -3051,7 +3056,7 @@
           <a:p>
             <a:fld id="{D4ECB0AF-16A4-4F14-B03D-AF220A658E3F}" type="datetime1">
               <a:rPr lang="de-DE" smtClean="0"/>
-              <a:t>13.06.2018</a:t>
+              <a:t>16.06.2018</a:t>
             </a:fld>
             <a:endParaRPr lang="de-DE"/>
           </a:p>
@@ -3288,7 +3293,7 @@
           <a:p>
             <a:fld id="{19418684-6EC8-4503-B780-8E3CEBDFDD19}" type="datetime1">
               <a:rPr lang="de-DE" smtClean="0"/>
-              <a:t>13.06.2018</a:t>
+              <a:t>16.06.2018</a:t>
             </a:fld>
             <a:endParaRPr lang="de-DE"/>
           </a:p>
@@ -3548,7 +3553,7 @@
           <a:p>
             <a:fld id="{4D814B29-5583-4F61-833A-5565650245CD}" type="datetime1">
               <a:rPr lang="de-DE" smtClean="0"/>
-              <a:t>13.06.2018</a:t>
+              <a:t>16.06.2018</a:t>
             </a:fld>
             <a:endParaRPr lang="de-DE"/>
           </a:p>
@@ -3788,7 +3793,7 @@
           <a:p>
             <a:fld id="{9315EA75-E5F5-456A-BBDE-B4383B613881}" type="datetime1">
               <a:rPr lang="de-DE" smtClean="0"/>
-              <a:t>13.06.2018</a:t>
+              <a:t>16.06.2018</a:t>
             </a:fld>
             <a:endParaRPr lang="de-DE"/>
           </a:p>
@@ -4174,7 +4179,7 @@
           <a:p>
             <a:fld id="{1672C5FF-223C-4E99-9B48-2C9C11A880F0}" type="datetime1">
               <a:rPr lang="de-DE" smtClean="0"/>
-              <a:t>13.06.2018</a:t>
+              <a:t>16.06.2018</a:t>
             </a:fld>
             <a:endParaRPr lang="de-DE"/>
           </a:p>
@@ -4296,7 +4301,7 @@
           <a:p>
             <a:fld id="{52593F9D-8A57-4396-BE6B-7A387D06B808}" type="datetime1">
               <a:rPr lang="de-DE" smtClean="0"/>
-              <a:t>13.06.2018</a:t>
+              <a:t>16.06.2018</a:t>
             </a:fld>
             <a:endParaRPr lang="de-DE"/>
           </a:p>
@@ -4395,7 +4400,7 @@
           <a:p>
             <a:fld id="{282B4572-39D1-4E64-ACA1-D5E20309AC63}" type="datetime1">
               <a:rPr lang="de-DE" smtClean="0"/>
-              <a:t>13.06.2018</a:t>
+              <a:t>16.06.2018</a:t>
             </a:fld>
             <a:endParaRPr lang="de-DE"/>
           </a:p>
@@ -4654,7 +4659,7 @@
           <a:p>
             <a:fld id="{5D883DB4-8EDA-4F56-8277-9504C8502440}" type="datetime1">
               <a:rPr lang="de-DE" smtClean="0"/>
-              <a:t>13.06.2018</a:t>
+              <a:t>16.06.2018</a:t>
             </a:fld>
             <a:endParaRPr lang="de-DE"/>
           </a:p>
@@ -4941,7 +4946,7 @@
           <a:p>
             <a:fld id="{C989E7C1-CEA7-49EA-8E14-9350A6C9E1DF}" type="datetime1">
               <a:rPr lang="de-DE" smtClean="0"/>
-              <a:t>13.06.2018</a:t>
+              <a:t>16.06.2018</a:t>
             </a:fld>
             <a:endParaRPr lang="de-DE"/>
           </a:p>
@@ -5349,7 +5354,7 @@
           <a:p>
             <a:fld id="{C9A8DFA1-E072-4BE1-852F-70A86B080717}" type="datetime1">
               <a:rPr lang="de-DE" smtClean="0"/>
-              <a:t>13.06.2018</a:t>
+              <a:t>16.06.2018</a:t>
             </a:fld>
             <a:endParaRPr lang="de-DE" dirty="0"/>
           </a:p>
@@ -6337,7 +6342,7 @@
         <p:spPr>
           <a:xfrm>
             <a:off x="8328640" y="53041"/>
-            <a:ext cx="3754506" cy="6674678"/>
+            <a:ext cx="3754506" cy="6674677"/>
           </a:xfrm>
           <a:prstGeom prst="rect">
             <a:avLst/>

</xml_diff>